<commit_message>
..and the powerpoint :)
</commit_message>
<xml_diff>
--- a/Whiteboard design session/WDS trainer presentation - AI-led business process automation.pptx
+++ b/Whiteboard design session/WDS trainer presentation - AI-led business process automation.pptx
@@ -248,7 +248,7 @@
           <a:p>
             <a:fld id="{52A13B17-C506-4D51-BB37-16B365906619}" type="datetimeFigureOut">
               <a:rPr lang="en-US" smtClean="0"/>
-              <a:t>7/20/2021</a:t>
+              <a:t>8/27/2021</a:t>
             </a:fld>
             <a:endParaRPr lang="en-US"/>
           </a:p>
@@ -6060,7 +6060,7 @@
                   <a:prstClr val="black"/>
                 </a:solidFill>
               </a:rPr>
-              <a:t>7/20/2021 1:29 PM</a:t>
+              <a:t>8/27/2021 3:31 PM</a:t>
             </a:fld>
             <a:endParaRPr lang="en-US" dirty="0">
               <a:solidFill>
@@ -24705,7 +24705,7 @@
       </p:sp>
       <p:pic>
         <p:nvPicPr>
-          <p:cNvPr id="11" name="Picture 10" descr="Preferred solution / Architecture Diagram">
+          <p:cNvPr id="11" name="Picture 10" descr="preferred solution high level architecture diagram explained in the notes">
             <a:extLst>
               <a:ext uri="{FF2B5EF4-FFF2-40B4-BE49-F238E27FC236}">
                 <a16:creationId xmlns:a16="http://schemas.microsoft.com/office/drawing/2014/main" id="{89FAB0CA-DDD1-4E27-A7E2-3A2BCAF0FFB5}"/>
@@ -24718,15 +24718,20 @@
           <p:nvPr/>
         </p:nvPicPr>
         <p:blipFill>
-          <a:blip r:embed="rId3"/>
-          <a:stretch>
-            <a:fillRect/>
-          </a:stretch>
+          <a:blip r:embed="rId3">
+            <a:extLst>
+              <a:ext uri="{28A0092B-C50C-407E-A947-70E740481C1C}">
+                <a14:useLocalDpi xmlns:a14="http://schemas.microsoft.com/office/drawing/2010/main" val="0"/>
+              </a:ext>
+            </a:extLst>
+          </a:blip>
+          <a:srcRect/>
+          <a:stretch/>
         </p:blipFill>
         <p:spPr>
           <a:xfrm>
-            <a:off x="778462" y="1118027"/>
-            <a:ext cx="10751618" cy="5494791"/>
+            <a:off x="778462" y="1128647"/>
+            <a:ext cx="10751618" cy="5473551"/>
           </a:xfrm>
           <a:prstGeom prst="rect">
             <a:avLst/>
@@ -25402,11 +25407,11 @@
   <p:clrMapOvr>
     <a:masterClrMapping/>
   </p:clrMapOvr>
-  <mc:AlternateContent xmlns:mc="http://schemas.openxmlformats.org/markup-compatibility/2006">
-    <mc:Choice xmlns:p14="http://schemas.microsoft.com/office/powerpoint/2010/main" Requires="p14">
+  <mc:AlternateContent xmlns:mc="http://schemas.openxmlformats.org/markup-compatibility/2006" xmlns:p14="http://schemas.microsoft.com/office/powerpoint/2010/main">
+    <mc:Choice Requires="p14">
       <p:transition p14:dur="0"/>
     </mc:Choice>
-    <mc:Fallback>
+    <mc:Fallback xmlns="">
       <p:transition/>
     </mc:Fallback>
   </mc:AlternateContent>
@@ -26198,11 +26203,11 @@
   <p:clrMapOvr>
     <a:masterClrMapping/>
   </p:clrMapOvr>
-  <mc:AlternateContent xmlns:mc="http://schemas.openxmlformats.org/markup-compatibility/2006">
-    <mc:Choice xmlns:p14="http://schemas.microsoft.com/office/powerpoint/2010/main" Requires="p14">
+  <mc:AlternateContent xmlns:mc="http://schemas.openxmlformats.org/markup-compatibility/2006" xmlns:p14="http://schemas.microsoft.com/office/powerpoint/2010/main">
+    <mc:Choice Requires="p14">
       <p:transition p14:dur="0"/>
     </mc:Choice>
-    <mc:Fallback>
+    <mc:Fallback xmlns="">
       <p:transition/>
     </mc:Fallback>
   </mc:AlternateContent>
@@ -27450,15 +27455,6 @@
 </file>
 
 <file path=customXml/item1.xml><?xml version="1.0" encoding="utf-8"?>
-<p:properties xmlns:p="http://schemas.microsoft.com/office/2006/metadata/properties" xmlns:xsi="http://www.w3.org/2001/XMLSchema-instance" xmlns:pc="http://schemas.microsoft.com/office/infopath/2007/PartnerControls">
-  <documentManagement>
-    <_ip_UnifiedCompliancePolicyUIAction xmlns="http://schemas.microsoft.com/sharepoint/v3" xsi:nil="true"/>
-    <_ip_UnifiedCompliancePolicyProperties xmlns="http://schemas.microsoft.com/sharepoint/v3" xsi:nil="true"/>
-  </documentManagement>
-</p:properties>
-</file>
-
-<file path=customXml/item2.xml><?xml version="1.0" encoding="utf-8"?>
 <ct:contentTypeSchema xmlns:ct="http://schemas.microsoft.com/office/2006/metadata/contentType" xmlns:ma="http://schemas.microsoft.com/office/2006/metadata/properties/metaAttributes" ct:_="" ma:_="" ma:contentTypeName="Document" ma:contentTypeID="0x010100D15DFA3690A15B4081582BBCC6BEAC3E" ma:contentTypeVersion="9" ma:contentTypeDescription="Create a new document." ma:contentTypeScope="" ma:versionID="642da1784587cbe85a7fdbbe4dc36103">
   <xsd:schema xmlns:xsd="http://www.w3.org/2001/XMLSchema" xmlns:xs="http://www.w3.org/2001/XMLSchema" xmlns:p="http://schemas.microsoft.com/office/2006/metadata/properties" xmlns:ns1="http://schemas.microsoft.com/sharepoint/v3" xmlns:ns2="2023ac63-7b75-4916-a9ee-591457758eee" xmlns:ns3="d9c797ad-d7c3-4982-82b7-81352a75e4a5" targetNamespace="http://schemas.microsoft.com/office/2006/metadata/properties" ma:root="true" ma:fieldsID="91198b0246576053cc55dd2c67035a89" ns1:_="" ns2:_="" ns3:_="">
     <xsd:import namespace="http://schemas.microsoft.com/sharepoint/v3"/>
@@ -27660,6 +27656,15 @@
 </ct:contentTypeSchema>
 </file>
 
+<file path=customXml/item2.xml><?xml version="1.0" encoding="utf-8"?>
+<p:properties xmlns:p="http://schemas.microsoft.com/office/2006/metadata/properties" xmlns:xsi="http://www.w3.org/2001/XMLSchema-instance" xmlns:pc="http://schemas.microsoft.com/office/infopath/2007/PartnerControls">
+  <documentManagement>
+    <_ip_UnifiedCompliancePolicyUIAction xmlns="http://schemas.microsoft.com/sharepoint/v3" xsi:nil="true"/>
+    <_ip_UnifiedCompliancePolicyProperties xmlns="http://schemas.microsoft.com/sharepoint/v3" xsi:nil="true"/>
+  </documentManagement>
+</p:properties>
+</file>
+
 <file path=customXml/item3.xml><?xml version="1.0" encoding="utf-8"?>
 <?mso-contentType ?>
 <FormTemplates xmlns="http://schemas.microsoft.com/sharepoint/v3/contenttype/forms">
@@ -27670,24 +27675,6 @@
 </file>
 
 <file path=customXml/itemProps1.xml><?xml version="1.0" encoding="utf-8"?>
-<ds:datastoreItem xmlns:ds="http://schemas.openxmlformats.org/officeDocument/2006/customXml" ds:itemID="{BAF7D529-36AB-45DA-B239-2F912F2D1610}">
-  <ds:schemaRefs>
-    <ds:schemaRef ds:uri="http://purl.org/dc/elements/1.1/"/>
-    <ds:schemaRef ds:uri="http://schemas.microsoft.com/office/infopath/2007/PartnerControls"/>
-    <ds:schemaRef ds:uri="2023ac63-7b75-4916-a9ee-591457758eee"/>
-    <ds:schemaRef ds:uri="http://schemas.microsoft.com/office/2006/metadata/properties"/>
-    <ds:schemaRef ds:uri="http://purl.org/dc/terms/"/>
-    <ds:schemaRef ds:uri="http://schemas.microsoft.com/sharepoint/v3"/>
-    <ds:schemaRef ds:uri="http://schemas.microsoft.com/office/2006/documentManagement/types"/>
-    <ds:schemaRef ds:uri="http://schemas.openxmlformats.org/package/2006/metadata/core-properties"/>
-    <ds:schemaRef ds:uri="d9c797ad-d7c3-4982-82b7-81352a75e4a5"/>
-    <ds:schemaRef ds:uri="http://www.w3.org/XML/1998/namespace"/>
-    <ds:schemaRef ds:uri="http://purl.org/dc/dcmitype/"/>
-  </ds:schemaRefs>
-</ds:datastoreItem>
-</file>
-
-<file path=customXml/itemProps2.xml><?xml version="1.0" encoding="utf-8"?>
 <ds:datastoreItem xmlns:ds="http://schemas.openxmlformats.org/officeDocument/2006/customXml" ds:itemID="{255F5BEB-6AD6-480A-8556-C80C5EBC10F2}">
   <ds:schemaRefs>
     <ds:schemaRef ds:uri="http://schemas.microsoft.com/office/2006/metadata/contentType"/>
@@ -27707,6 +27694,24 @@
 </ds:datastoreItem>
 </file>
 
+<file path=customXml/itemProps2.xml><?xml version="1.0" encoding="utf-8"?>
+<ds:datastoreItem xmlns:ds="http://schemas.openxmlformats.org/officeDocument/2006/customXml" ds:itemID="{BAF7D529-36AB-45DA-B239-2F912F2D1610}">
+  <ds:schemaRefs>
+    <ds:schemaRef ds:uri="http://purl.org/dc/elements/1.1/"/>
+    <ds:schemaRef ds:uri="http://schemas.microsoft.com/office/infopath/2007/PartnerControls"/>
+    <ds:schemaRef ds:uri="2023ac63-7b75-4916-a9ee-591457758eee"/>
+    <ds:schemaRef ds:uri="http://schemas.microsoft.com/office/2006/metadata/properties"/>
+    <ds:schemaRef ds:uri="http://purl.org/dc/terms/"/>
+    <ds:schemaRef ds:uri="http://schemas.microsoft.com/sharepoint/v3"/>
+    <ds:schemaRef ds:uri="http://schemas.microsoft.com/office/2006/documentManagement/types"/>
+    <ds:schemaRef ds:uri="http://schemas.openxmlformats.org/package/2006/metadata/core-properties"/>
+    <ds:schemaRef ds:uri="d9c797ad-d7c3-4982-82b7-81352a75e4a5"/>
+    <ds:schemaRef ds:uri="http://www.w3.org/XML/1998/namespace"/>
+    <ds:schemaRef ds:uri="http://purl.org/dc/dcmitype/"/>
+  </ds:schemaRefs>
+</ds:datastoreItem>
+</file>
+
 <file path=customXml/itemProps3.xml><?xml version="1.0" encoding="utf-8"?>
 <ds:datastoreItem xmlns:ds="http://schemas.openxmlformats.org/officeDocument/2006/customXml" ds:itemID="{F18501AF-04CF-4482-BAE1-607B49DDC378}">
   <ds:schemaRefs>

</xml_diff>